<commit_message>
TOM 14 Ich bin in einer Tomate
Für Promotion überarbeitet
</commit_message>
<xml_diff>
--- a/training-cards/music moves/Tomatoes (TOM)/ger/apprentice/ger_TOM_14_Ich_bin_in_einer_Tomate_MM_A.pptx
+++ b/training-cards/music moves/Tomatoes (TOM)/ger/apprentice/ger_TOM_14_Ich_bin_in_einer_Tomate_MM_A.pptx
@@ -166,7 +166,7 @@
           </a:lstStyle>
           <a:p>
             <a:r>
-              <a:rPr lang="de-DE" smtClean="0"/>
+              <a:rPr lang="de-DE"/>
               <a:t>Mastertitelformat bearbeiten</a:t>
             </a:r>
             <a:endParaRPr lang="de-DE" dirty="0"/>
@@ -287,7 +287,7 @@
           </a:lstStyle>
           <a:p>
             <a:r>
-              <a:rPr lang="de-DE" smtClean="0"/>
+              <a:rPr lang="de-DE"/>
               <a:t>Master-Untertitelformat bearbeiten</a:t>
             </a:r>
             <a:endParaRPr lang="de-DE" dirty="0"/>
@@ -321,35 +321,35 @@
           <a:p>
             <a:pPr lvl="0"/>
             <a:r>
-              <a:rPr lang="de-DE" smtClean="0"/>
+              <a:rPr lang="de-DE"/>
               <a:t>Mastertextformat bearbeiten</a:t>
             </a:r>
           </a:p>
           <a:p>
             <a:pPr lvl="1"/>
             <a:r>
-              <a:rPr lang="de-DE" smtClean="0"/>
+              <a:rPr lang="de-DE"/>
               <a:t>Zweite Ebene</a:t>
             </a:r>
           </a:p>
           <a:p>
             <a:pPr lvl="2"/>
             <a:r>
-              <a:rPr lang="de-DE" smtClean="0"/>
+              <a:rPr lang="de-DE"/>
               <a:t>Dritte Ebene</a:t>
             </a:r>
           </a:p>
           <a:p>
             <a:pPr lvl="3"/>
             <a:r>
-              <a:rPr lang="de-DE" smtClean="0"/>
+              <a:rPr lang="de-DE"/>
               <a:t>Vierte Ebene</a:t>
             </a:r>
           </a:p>
           <a:p>
             <a:pPr lvl="4"/>
             <a:r>
-              <a:rPr lang="de-DE" smtClean="0"/>
+              <a:rPr lang="de-DE"/>
               <a:t>Fünfte Ebene</a:t>
             </a:r>
             <a:endParaRPr lang="de-DE" dirty="0"/>
@@ -397,7 +397,7 @@
           <a:p>
             <a:pPr algn="l"/>
             <a:r>
-              <a:rPr lang="de-DE" sz="1000" dirty="0" smtClean="0">
+              <a:rPr lang="de-DE" sz="1000" dirty="0">
                 <a:solidFill>
                   <a:srgbClr val="5D5E5F"/>
                 </a:solidFill>
@@ -407,7 +407,7 @@
               <a:t>REGINA</a:t>
             </a:r>
             <a:r>
-              <a:rPr lang="de-DE" sz="1000" baseline="0" dirty="0" smtClean="0">
+              <a:rPr lang="de-DE" sz="1000" baseline="0" dirty="0">
                 <a:solidFill>
                   <a:srgbClr val="5D5E5F"/>
                 </a:solidFill>
@@ -417,7 +417,7 @@
               <a:t> BRANDHUBER</a:t>
             </a:r>
             <a:r>
-              <a:rPr lang="de-DE" sz="1000" dirty="0" smtClean="0">
+              <a:rPr lang="de-DE" sz="1000" dirty="0">
                 <a:solidFill>
                   <a:srgbClr val="5D5E5F"/>
                 </a:solidFill>
@@ -426,13 +426,6 @@
               </a:rPr>
               <a:t> </a:t>
             </a:r>
-            <a:endParaRPr lang="de-DE" sz="1000" dirty="0">
-              <a:solidFill>
-                <a:srgbClr val="5D5E5F"/>
-              </a:solidFill>
-              <a:latin typeface="Avenir Book"/>
-              <a:cs typeface="Avenir Book"/>
-            </a:endParaRPr>
           </a:p>
         </p:txBody>
       </p:sp>
@@ -545,35 +538,35 @@
           <a:p>
             <a:pPr lvl="0"/>
             <a:r>
-              <a:rPr lang="de-DE" smtClean="0"/>
+              <a:rPr lang="de-DE"/>
               <a:t>Mastertextformat bearbeiten</a:t>
             </a:r>
           </a:p>
           <a:p>
             <a:pPr lvl="1"/>
             <a:r>
-              <a:rPr lang="de-DE" smtClean="0"/>
+              <a:rPr lang="de-DE"/>
               <a:t>Zweite Ebene</a:t>
             </a:r>
           </a:p>
           <a:p>
             <a:pPr lvl="2"/>
             <a:r>
-              <a:rPr lang="de-DE" smtClean="0"/>
+              <a:rPr lang="de-DE"/>
               <a:t>Dritte Ebene</a:t>
             </a:r>
           </a:p>
           <a:p>
             <a:pPr lvl="3"/>
             <a:r>
-              <a:rPr lang="de-DE" smtClean="0"/>
+              <a:rPr lang="de-DE"/>
               <a:t>Vierte Ebene</a:t>
             </a:r>
           </a:p>
           <a:p>
             <a:pPr lvl="4"/>
             <a:r>
-              <a:rPr lang="de-DE" smtClean="0"/>
+              <a:rPr lang="de-DE"/>
               <a:t>Fünfte Ebene</a:t>
             </a:r>
             <a:endParaRPr lang="de-DE" dirty="0"/>
@@ -603,7 +596,7 @@
           <a:lstStyle/>
           <a:p>
             <a:r>
-              <a:rPr lang="de-DE" sz="2400" dirty="0" smtClean="0">
+              <a:rPr lang="de-DE" sz="2400" dirty="0">
                 <a:solidFill>
                   <a:srgbClr val="7E006B"/>
                 </a:solidFill>
@@ -613,7 +606,7 @@
               <a:t>TR	AININGS</a:t>
             </a:r>
             <a:r>
-              <a:rPr lang="de-DE" sz="2400" dirty="0" smtClean="0">
+              <a:rPr lang="de-DE" sz="2400" dirty="0">
                 <a:solidFill>
                   <a:srgbClr val="7E006B"/>
                 </a:solidFill>
@@ -708,10 +701,9 @@
           <a:lstStyle/>
           <a:p>
             <a:r>
-              <a:rPr lang="de-DE" smtClean="0"/>
+              <a:rPr lang="de-DE"/>
               <a:t>Mastertitelformat bearbeiten</a:t>
             </a:r>
-            <a:endParaRPr lang="de-DE"/>
           </a:p>
         </p:txBody>
       </p:sp>
@@ -732,7 +724,7 @@
           <a:p>
             <a:fld id="{FF5B2BAF-DF38-0A48-A798-0C06E514FD52}" type="datetimeFigureOut">
               <a:rPr lang="de-DE" smtClean="0"/>
-              <a:t>08.03.16</a:t>
+              <a:t>12.09.18</a:t>
             </a:fld>
             <a:endParaRPr lang="de-DE" dirty="0"/>
           </a:p>
@@ -843,10 +835,9 @@
           <a:p>
             <a:pPr marL="0" lvl="0" algn="l"/>
             <a:r>
-              <a:rPr lang="de-DE" dirty="0" smtClean="0"/>
+              <a:rPr lang="de-DE" dirty="0"/>
               <a:t>Überschrift bearbeiten </a:t>
             </a:r>
-            <a:endParaRPr lang="de-DE" dirty="0"/>
           </a:p>
         </p:txBody>
       </p:sp>
@@ -877,38 +868,37 @@
           <a:p>
             <a:pPr lvl="0"/>
             <a:r>
-              <a:rPr lang="de-DE" dirty="0" smtClean="0"/>
+              <a:rPr lang="de-DE" dirty="0"/>
               <a:t>Mastertextformat bearbeiten</a:t>
             </a:r>
           </a:p>
           <a:p>
             <a:pPr lvl="1"/>
             <a:r>
-              <a:rPr lang="de-DE" dirty="0" smtClean="0"/>
+              <a:rPr lang="de-DE" dirty="0"/>
               <a:t>Zweite Ebene</a:t>
             </a:r>
           </a:p>
           <a:p>
             <a:pPr lvl="2"/>
             <a:r>
-              <a:rPr lang="de-DE" dirty="0" smtClean="0"/>
+              <a:rPr lang="de-DE" dirty="0"/>
               <a:t>Dritte Ebene</a:t>
             </a:r>
           </a:p>
           <a:p>
             <a:pPr lvl="3"/>
             <a:r>
-              <a:rPr lang="de-DE" dirty="0" smtClean="0"/>
+              <a:rPr lang="de-DE" dirty="0"/>
               <a:t>Vierte Ebene</a:t>
             </a:r>
           </a:p>
           <a:p>
             <a:pPr lvl="4"/>
             <a:r>
-              <a:rPr lang="de-DE" dirty="0" smtClean="0"/>
+              <a:rPr lang="de-DE" dirty="0"/>
               <a:t>Fünfte Ebene</a:t>
             </a:r>
-            <a:endParaRPr lang="de-DE" dirty="0"/>
           </a:p>
         </p:txBody>
       </p:sp>
@@ -947,7 +937,7 @@
           <a:p>
             <a:fld id="{FF5B2BAF-DF38-0A48-A798-0C06E514FD52}" type="datetimeFigureOut">
               <a:rPr lang="de-DE" smtClean="0"/>
-              <a:t>08.03.16</a:t>
+              <a:t>12.09.18</a:t>
             </a:fld>
             <a:endParaRPr lang="de-DE" dirty="0"/>
           </a:p>
@@ -1181,7 +1171,7 @@
           <a:lstStyle/>
           <a:p>
             <a:r>
-              <a:rPr lang="de-DE" sz="1050" b="1" dirty="0" smtClean="0">
+              <a:rPr lang="de-DE" sz="1050" b="1" dirty="0">
                 <a:solidFill>
                   <a:schemeClr val="bg1"/>
                 </a:solidFill>
@@ -1191,7 +1181,7 @@
               <a:t>TRAININGSKARTE</a:t>
             </a:r>
             <a:r>
-              <a:rPr lang="de-DE" sz="1050" dirty="0" smtClean="0">
+              <a:rPr lang="de-DE" sz="1050" dirty="0">
                 <a:solidFill>
                   <a:schemeClr val="bg1"/>
                 </a:solidFill>
@@ -1201,7 +1191,7 @@
               <a:t> </a:t>
             </a:r>
             <a:r>
-              <a:rPr lang="de-DE" sz="1050" b="1" dirty="0" smtClean="0">
+              <a:rPr lang="de-DE" sz="1050" b="1" dirty="0">
                 <a:solidFill>
                   <a:schemeClr val="bg1"/>
                 </a:solidFill>
@@ -1210,13 +1200,6 @@
               </a:rPr>
               <a:t>TOM 14</a:t>
             </a:r>
-            <a:endParaRPr lang="de-DE" sz="1050" b="1" dirty="0">
-              <a:solidFill>
-                <a:schemeClr val="bg1"/>
-              </a:solidFill>
-              <a:latin typeface="Avenir Heavy"/>
-              <a:cs typeface="Avenir Heavy"/>
-            </a:endParaRPr>
           </a:p>
         </p:txBody>
       </p:sp>
@@ -1600,7 +1583,7 @@
         </p:blipFill>
         <p:spPr>
           <a:xfrm>
-            <a:off x="5784914" y="3079222"/>
+            <a:off x="5792935" y="2766403"/>
             <a:ext cx="1309623" cy="1179957"/>
           </a:xfrm>
           <a:prstGeom prst="rect">
@@ -1629,20 +1612,16 @@
           <a:lstStyle/>
           <a:p>
             <a:r>
-              <a:rPr lang="de-DE" dirty="0" smtClean="0"/>
+              <a:rPr lang="de-DE" dirty="0"/>
               <a:t>ICH BIN </a:t>
             </a:r>
             <a:r>
-              <a:rPr lang="de-DE" dirty="0" smtClean="0">
+              <a:rPr lang="de-DE" dirty="0">
                 <a:latin typeface="Avenir Book"/>
                 <a:cs typeface="Avenir Book"/>
               </a:rPr>
               <a:t>IN EINER TOMATE</a:t>
             </a:r>
-            <a:endParaRPr lang="de-DE" dirty="0">
-              <a:latin typeface="Avenir Book"/>
-              <a:cs typeface="Avenir Book"/>
-            </a:endParaRPr>
           </a:p>
         </p:txBody>
       </p:sp>
@@ -1659,173 +1638,200 @@
         <p:spPr/>
         <p:txBody>
           <a:bodyPr>
-            <a:normAutofit/>
+            <a:noAutofit/>
           </a:bodyPr>
           <a:lstStyle/>
           <a:p>
             <a:r>
-              <a:rPr lang="de-DE" dirty="0"/>
-              <a:t>Du kannst die </a:t>
-            </a:r>
-            <a:r>
-              <a:rPr lang="de-DE" dirty="0" smtClean="0"/>
-              <a:t>„Tomate“</a:t>
-            </a:r>
-            <a:r>
-              <a:rPr lang="de-DE" baseline="30000" dirty="0" smtClean="0"/>
+              <a:rPr lang="de-DE" sz="850" dirty="0"/>
+              <a:t>Du kannst die Pomodoro</a:t>
+            </a:r>
+            <a:r>
+              <a:rPr lang="de-DE" sz="850" baseline="30000" dirty="0"/>
               <a:t>1</a:t>
             </a:r>
             <a:r>
-              <a:rPr lang="de-DE" dirty="0" smtClean="0"/>
-              <a:t> </a:t>
-            </a:r>
-            <a:r>
-              <a:rPr lang="de-DE" dirty="0"/>
-              <a:t>zu einem Schutzraum für Deine Konzentration machen. Dazu braucht es Training, wie Du mit Störern und </a:t>
-            </a:r>
-            <a:r>
-              <a:rPr lang="de-DE" dirty="0" err="1"/>
+              <a:rPr lang="de-DE" sz="850" dirty="0"/>
+              <a:t> zu einem Schutzraum für Deine Konzentration machen. Dazu braucht es Training, wie Du mit Störern und </a:t>
+            </a:r>
+            <a:r>
+              <a:rPr lang="de-DE" sz="850" dirty="0" err="1"/>
               <a:t>Ablenkern</a:t>
             </a:r>
             <a:r>
-              <a:rPr lang="de-DE" dirty="0"/>
+              <a:rPr lang="de-DE" sz="850" dirty="0"/>
               <a:t> umgehen kannst. </a:t>
             </a:r>
           </a:p>
           <a:p>
             <a:r>
-              <a:rPr lang="de-DE" dirty="0"/>
+              <a:rPr lang="de-DE" sz="850" dirty="0"/>
               <a:t>Störer sind Unterbrechungen von außen, z.B. Telefon, Klingel, Mitbewohner, Arbeitskollegen, etc. </a:t>
             </a:r>
           </a:p>
           <a:p>
             <a:r>
-              <a:rPr lang="de-DE" dirty="0" err="1"/>
+              <a:rPr lang="de-DE" sz="850" dirty="0" err="1"/>
               <a:t>Ablenker</a:t>
             </a:r>
             <a:r>
-              <a:rPr lang="de-DE" dirty="0"/>
-              <a:t> sind Impulse oder Gedanken, die aus Dir heraus entstehen, und das Ziel der Tomate nicht unmittelbar verfolgen. </a:t>
-            </a:r>
-          </a:p>
-          <a:p>
-            <a:r>
-              <a:rPr lang="de-DE" dirty="0"/>
-              <a:t>Beide Ereignisse unterbrechen Deine Konzentration. Im einen Fall brauche ich einen passenden Umgang mit meinem Umfeld und im anderen Fall Training, um bei der Sache bleiben zu können.  </a:t>
-            </a:r>
-          </a:p>
-          <a:p>
-            <a:r>
-              <a:rPr lang="de-DE" dirty="0" smtClean="0"/>
-              <a:t>In </a:t>
-            </a:r>
-            <a:r>
-              <a:rPr lang="de-DE" dirty="0"/>
-              <a:t>Ausnahmefällen kann man die Tomate stoppen. Überlege aber genau, was ein echter Ausnahmefall ist. Sobald das Notwendigste geregelt ist, lässt man den </a:t>
-            </a:r>
-            <a:r>
-              <a:rPr lang="de-DE" dirty="0" err="1"/>
-              <a:t>Timer</a:t>
-            </a:r>
-            <a:r>
-              <a:rPr lang="de-DE" dirty="0"/>
-              <a:t> weiterlaufen. Die Tomate sollte möglichst kurz unterbrochen werden, um den </a:t>
-            </a:r>
-            <a:r>
-              <a:rPr lang="de-DE" dirty="0" smtClean="0"/>
-              <a:t/>
+              <a:rPr lang="de-DE" sz="850" dirty="0"/>
+              <a:t> sind Impulse oder Gedanken, die aus Dir heraus entstehen, und das Ziel der </a:t>
+            </a:r>
+            <a:r>
+              <a:rPr lang="de-DE" sz="850" dirty="0" err="1"/>
+              <a:t>Pomodoro</a:t>
+            </a:r>
+            <a:r>
+              <a:rPr lang="de-DE" sz="850" dirty="0"/>
+              <a:t>    nicht unmittelbar verfolgen. </a:t>
+            </a:r>
+          </a:p>
+          <a:p>
+            <a:r>
+              <a:rPr lang="de-DE" sz="850" dirty="0"/>
+              <a:t>Beide Ereignisse unterbrechen Deine Konzentration. Im einen Fall brauche ich einen passenden Umgang mit meinem Umfeld und im anderen Fall Training, um bei der Sache bleiben zu können. In beiden Fälle kannst Du Deine </a:t>
+            </a:r>
+            <a:r>
+              <a:rPr lang="de-DE" sz="850" dirty="0" err="1"/>
+              <a:t>Pomodoro</a:t>
+            </a:r>
+            <a:r>
+              <a:rPr lang="de-DE" sz="850" dirty="0"/>
+              <a:t> mit der gleichen Strategie beschützen.</a:t>
+            </a:r>
+          </a:p>
+          <a:p>
+            <a:r>
+              <a:rPr lang="de-DE" sz="850" dirty="0"/>
+              <a:t>Trainiere zunächst den Umgang mit </a:t>
+            </a:r>
+            <a:r>
+              <a:rPr lang="de-DE" sz="850" dirty="0" err="1"/>
+              <a:t>Ablenkern</a:t>
+            </a:r>
+            <a:r>
+              <a:rPr lang="de-DE" sz="850" dirty="0"/>
+              <a:t>, indem Du sie sichtbar machst und jeden Gedanken, der Dich unterbricht dokumentierst. Entweder ein kleiner Strich in Deinem Übe-Tagebuch und/oder einen </a:t>
             </a:r>
             <a:br>
-              <a:rPr lang="de-DE" dirty="0" smtClean="0"/>
+              <a:rPr lang="de-DE" sz="850" dirty="0"/>
             </a:br>
             <a:r>
-              <a:rPr lang="de-DE" dirty="0" smtClean="0"/>
-              <a:t>Konzentrationsfaden </a:t>
-            </a:r>
-            <a:r>
-              <a:rPr lang="de-DE" dirty="0"/>
-              <a:t>nicht abreißen zu lassen</a:t>
-            </a:r>
-            <a:r>
-              <a:rPr lang="de-DE" dirty="0" smtClean="0"/>
-              <a:t>. Hier solltest Du nicht zu </a:t>
+              <a:rPr lang="de-DE" sz="850" dirty="0"/>
+              <a:t>Vermerk für eine spätere </a:t>
+            </a:r>
+            <a:r>
+              <a:rPr lang="de-DE" sz="850" dirty="0" err="1"/>
+              <a:t>Pomodoro</a:t>
+            </a:r>
+            <a:r>
+              <a:rPr lang="de-DE" sz="850" dirty="0"/>
+              <a:t>, wenn Dir gerade eine Aufgabe eingefallen ist, die Du </a:t>
             </a:r>
             <a:br>
-              <a:rPr lang="de-DE" dirty="0" smtClean="0"/>
+              <a:rPr lang="de-DE" sz="850" dirty="0"/>
             </a:br>
             <a:r>
-              <a:rPr lang="de-DE" dirty="0" smtClean="0"/>
-              <a:t>großzügig mit Dir sein, da sonst der gewünschte Trainingsreiz verloren geht.</a:t>
-            </a:r>
-            <a:endParaRPr lang="de-DE" dirty="0"/>
+              <a:rPr lang="de-DE" sz="850" dirty="0"/>
+              <a:t>erledigen musst. Du kannst die Notizen gleich nach Dringlichkeit filtern. Was heute erledigt </a:t>
+            </a:r>
+            <a:br>
+              <a:rPr lang="de-DE" sz="850" dirty="0"/>
+            </a:br>
+            <a:r>
+              <a:rPr lang="de-DE" sz="850" dirty="0"/>
+              <a:t>werden muss, kommt sofort in den Tagesplan. Was du später erledigen willst, kann in Dein </a:t>
+            </a:r>
+            <a:br>
+              <a:rPr lang="de-DE" sz="850" dirty="0"/>
+            </a:br>
+            <a:r>
+              <a:rPr lang="de-DE" sz="850" dirty="0" err="1"/>
+              <a:t>Backlog</a:t>
+            </a:r>
+            <a:r>
+              <a:rPr lang="de-DE" sz="850" dirty="0"/>
+              <a:t>.</a:t>
+            </a:r>
+          </a:p>
+          <a:p>
+            <a:r>
+              <a:rPr lang="de-DE" sz="850" dirty="0"/>
+              <a:t>Genauso gehst du mit Störern um, nur dass Du hier dein Umfeld mitnehmen musst, um ihnen zu </a:t>
+            </a:r>
+            <a:br>
+              <a:rPr lang="de-DE" sz="850" dirty="0"/>
+            </a:br>
+            <a:r>
+              <a:rPr lang="de-DE" sz="850" dirty="0"/>
+              <a:t>erklären, was eine </a:t>
+            </a:r>
+            <a:r>
+              <a:rPr lang="de-DE" sz="850" dirty="0" err="1"/>
+              <a:t>Pomodoro</a:t>
+            </a:r>
+            <a:r>
+              <a:rPr lang="de-DE" sz="850" dirty="0"/>
+              <a:t> ist, und dass Du Dir einen Vermerk machst um später von Deiner </a:t>
+            </a:r>
+            <a:br>
+              <a:rPr lang="de-DE" sz="850" dirty="0"/>
+            </a:br>
+            <a:r>
+              <a:rPr lang="de-DE" sz="850" dirty="0"/>
+              <a:t>Seite aus darauf zurückzukommen. Wenn Du das wirklich tust, baut Dein Umfeld Vertrauen auf, und </a:t>
+            </a:r>
+            <a:br>
+              <a:rPr lang="de-DE" sz="850" dirty="0"/>
+            </a:br>
+            <a:r>
+              <a:rPr lang="de-DE" sz="850" dirty="0"/>
+              <a:t>es lernt Deine </a:t>
+            </a:r>
+            <a:r>
+              <a:rPr lang="de-DE" sz="850" dirty="0" err="1"/>
+              <a:t>Pomodoro</a:t>
+            </a:r>
+            <a:r>
+              <a:rPr lang="de-DE" sz="850" dirty="0"/>
+              <a:t> mit dir zusammen zu beschützen. </a:t>
+            </a:r>
+          </a:p>
+          <a:p>
+            <a:r>
+              <a:rPr lang="de-DE" sz="850" dirty="0"/>
+              <a:t>Weitere Ideen:</a:t>
+            </a:r>
           </a:p>
           <a:p>
             <a:pPr lvl="1"/>
             <a:r>
-              <a:rPr lang="de-DE" dirty="0"/>
-              <a:t>Möglicher Umgang mit Unterbrechungen: </a:t>
-            </a:r>
-          </a:p>
-          <a:p>
-            <a:pPr lvl="2"/>
-            <a:r>
-              <a:rPr lang="de-DE" dirty="0"/>
-              <a:t>Tomate wird verworfen und man beginnt nach Unterbrechung </a:t>
-            </a:r>
-            <a:r>
-              <a:rPr lang="de-DE" dirty="0" smtClean="0"/>
-              <a:t/>
-            </a:r>
-            <a:br>
-              <a:rPr lang="de-DE" dirty="0" smtClean="0"/>
-            </a:br>
-            <a:r>
-              <a:rPr lang="de-DE" dirty="0" smtClean="0"/>
-              <a:t>immer </a:t>
-            </a:r>
-            <a:r>
-              <a:rPr lang="de-DE" dirty="0"/>
-              <a:t>eine neue Tomate. </a:t>
-            </a:r>
-          </a:p>
-          <a:p>
-            <a:pPr lvl="2"/>
-            <a:r>
-              <a:rPr lang="de-DE" dirty="0"/>
-              <a:t>Tomate kann </a:t>
-            </a:r>
-            <a:r>
-              <a:rPr lang="de-DE" dirty="0" smtClean="0"/>
-              <a:t>1-5 min</a:t>
-            </a:r>
-            <a:r>
-              <a:rPr lang="de-DE" dirty="0" smtClean="0"/>
-              <a:t> </a:t>
-            </a:r>
-            <a:r>
-              <a:rPr lang="de-DE" dirty="0"/>
-              <a:t>unterbrochen werden und läuft dann </a:t>
-            </a:r>
-            <a:r>
-              <a:rPr lang="de-DE" dirty="0" smtClean="0"/>
-              <a:t/>
-            </a:r>
-            <a:br>
-              <a:rPr lang="de-DE" dirty="0" smtClean="0"/>
-            </a:br>
-            <a:r>
-              <a:rPr lang="de-DE" dirty="0" smtClean="0"/>
-              <a:t>wieder </a:t>
-            </a:r>
-            <a:r>
-              <a:rPr lang="de-DE" dirty="0"/>
-              <a:t>weiter</a:t>
-            </a:r>
-            <a:r>
-              <a:rPr lang="de-DE" dirty="0" smtClean="0"/>
-              <a:t>. Bei längerer Unterbrechung beginnst Du eine neue Tomate.</a:t>
-            </a:r>
-            <a:endParaRPr lang="de-DE" dirty="0"/>
+              <a:rPr lang="de-DE" sz="850" dirty="0"/>
+              <a:t>Du kannst auch ein Schild auf Deinem Schreibtisch aufstellen, das anzeigt, wenn du in einer Tomate bist.</a:t>
+            </a:r>
+          </a:p>
+          <a:p>
+            <a:pPr lvl="1"/>
+            <a:r>
+              <a:rPr lang="de-DE" sz="850" dirty="0"/>
+              <a:t>Telefon aus und Anrufbeantworter abhören als regelmäßige </a:t>
+            </a:r>
+            <a:r>
+              <a:rPr lang="de-DE" sz="850" dirty="0" err="1"/>
+              <a:t>Pomodoro</a:t>
+            </a:r>
+            <a:r>
+              <a:rPr lang="de-DE" sz="850" dirty="0"/>
+              <a:t> einplanen</a:t>
+            </a:r>
+          </a:p>
+          <a:p>
+            <a:pPr lvl="1"/>
+            <a:r>
+              <a:rPr lang="de-DE" sz="850" dirty="0"/>
+              <a:t>Klingelton des Mailprogramms ausschalten </a:t>
+            </a:r>
           </a:p>
         </p:txBody>
       </p:sp>
@@ -1945,7 +1951,7 @@
           </a:lstStyle>
           <a:p>
             <a:r>
-              <a:rPr lang="de-DE" sz="900" baseline="30000" dirty="0" smtClean="0">
+              <a:rPr lang="de-DE" sz="900" baseline="30000" dirty="0">
                 <a:solidFill>
                   <a:schemeClr val="bg1">
                     <a:lumMod val="65000"/>
@@ -1955,7 +1961,7 @@
               <a:t>1</a:t>
             </a:r>
             <a:r>
-              <a:rPr lang="de-DE" sz="900" dirty="0" smtClean="0">
+              <a:rPr lang="de-DE" sz="900" dirty="0">
                 <a:solidFill>
                   <a:schemeClr val="bg1">
                     <a:lumMod val="65000"/>
@@ -1965,7 +1971,7 @@
               <a:t>  </a:t>
             </a:r>
             <a:r>
-              <a:rPr lang="de-DE" sz="900" dirty="0" err="1" smtClean="0">
+              <a:rPr lang="de-DE" sz="900" dirty="0" err="1">
                 <a:solidFill>
                   <a:schemeClr val="bg1">
                     <a:lumMod val="65000"/>
@@ -2032,17 +2038,25 @@
         </p:spPr>
         <p:txBody>
           <a:bodyPr>
-            <a:normAutofit lnSpcReduction="10000"/>
+            <a:normAutofit/>
           </a:bodyPr>
           <a:lstStyle/>
           <a:p>
             <a:r>
               <a:rPr lang="de-DE" dirty="0"/>
-              <a:t>Schreibe 2 Wochen lang zu jeder Tomate eine Liste mit Deinen Störern und </a:t>
+              <a:t>Notiere 2 Wochen lang zu jeder </a:t>
             </a:r>
             <a:r>
               <a:rPr lang="de-DE" dirty="0" err="1"/>
-              <a:t>Ablenkern</a:t>
+              <a:t>Pomodoro</a:t>
+            </a:r>
+            <a:r>
+              <a:rPr lang="de-DE" dirty="0"/>
+              <a:t> Deine Störer und </a:t>
+            </a:r>
+            <a:r>
+              <a:rPr lang="de-DE" dirty="0" err="1"/>
+              <a:t>Ablenker</a:t>
             </a:r>
             <a:r>
               <a:rPr lang="de-DE" dirty="0"/>
@@ -2060,13 +2074,19 @@
             </a:r>
             <a:r>
               <a:rPr lang="de-DE" dirty="0"/>
-              <a:t> den genauen Gedanken, der Dich ablenkte, und zu jedem Störer, wer und warum.</a:t>
+              <a:t> den genauen Gedanken, der Dich ablenkte, und zu jedem Störer, wer und warum. Wenn Du möchtest, kannst du neue Aufgaben sofort in Deinen Tages- oder Wochenplan schreiben.</a:t>
             </a:r>
           </a:p>
           <a:p>
             <a:r>
               <a:rPr lang="de-DE" dirty="0"/>
-              <a:t>Schau nach der Tomate Deine </a:t>
+              <a:t>Gedanken, die Du nicht weiter verfolgen möchtest, kannst Du durchstreichen.</a:t>
+            </a:r>
+          </a:p>
+          <a:p>
+            <a:r>
+              <a:rPr lang="de-DE" dirty="0"/>
+              <a:t>Erstelle 8 Störer-</a:t>
             </a:r>
             <a:r>
               <a:rPr lang="de-DE" dirty="0" err="1"/>
@@ -2074,131 +2094,7 @@
             </a:r>
             <a:r>
               <a:rPr lang="de-DE" dirty="0"/>
-              <a:t> nochmals durch und überlege, welche Gedanken Du in einer </a:t>
-            </a:r>
-            <a:r>
-              <a:rPr lang="de-DE" dirty="0" smtClean="0"/>
-              <a:t>Folgetomate </a:t>
-            </a:r>
-            <a:r>
-              <a:rPr lang="de-DE" dirty="0"/>
-              <a:t>noch einmal verfolgen möchtest und welche Du </a:t>
-            </a:r>
-            <a:r>
-              <a:rPr lang="de-DE" dirty="0" smtClean="0"/>
-              <a:t>wegstreichen </a:t>
-            </a:r>
-            <a:r>
-              <a:rPr lang="de-DE" dirty="0"/>
-              <a:t>möchtest, weil es sich nicht lohnt sie weiterzuverfolgen.  </a:t>
-            </a:r>
-          </a:p>
-          <a:p>
-            <a:r>
-              <a:rPr lang="de-DE" dirty="0"/>
-              <a:t>Zähle Deine Störer auf der Liste zusammen und notiere für jeden Störer, welche Lösung Du dafür in der nächsten Tomate finden </a:t>
-            </a:r>
-            <a:r>
-              <a:rPr lang="de-DE" dirty="0" smtClean="0"/>
-              <a:t>möchtest. </a:t>
-            </a:r>
-            <a:r>
-              <a:rPr lang="de-DE" dirty="0" smtClean="0"/>
-              <a:t>Mögliche </a:t>
-            </a:r>
-            <a:r>
-              <a:rPr lang="de-DE" dirty="0"/>
-              <a:t>Lösungen für Störer: </a:t>
-            </a:r>
-          </a:p>
-          <a:p>
-            <a:pPr lvl="1"/>
-            <a:r>
-              <a:rPr lang="de-DE" dirty="0"/>
-              <a:t>Telefon während einer Tomate ausschalten oder ignorieren, um nach der </a:t>
-            </a:r>
-            <a:r>
-              <a:rPr lang="de-DE" dirty="0" smtClean="0"/>
-              <a:t/>
-            </a:r>
-            <a:br>
-              <a:rPr lang="de-DE" dirty="0" smtClean="0"/>
-            </a:br>
-            <a:r>
-              <a:rPr lang="de-DE" dirty="0" smtClean="0"/>
-              <a:t>Tomate </a:t>
-            </a:r>
-            <a:r>
-              <a:rPr lang="de-DE" dirty="0"/>
-              <a:t>zurückzurufen.</a:t>
-            </a:r>
-          </a:p>
-          <a:p>
-            <a:pPr lvl="1"/>
-            <a:r>
-              <a:rPr lang="de-DE" dirty="0"/>
-              <a:t>Arbeitskollegen und Mitbewohner die Tomatentechnik erklären. Evtl. ein </a:t>
-            </a:r>
-            <a:r>
-              <a:rPr lang="de-DE" dirty="0" smtClean="0"/>
-              <a:t/>
-            </a:r>
-            <a:br>
-              <a:rPr lang="de-DE" dirty="0" smtClean="0"/>
-            </a:br>
-            <a:r>
-              <a:rPr lang="de-DE" dirty="0" smtClean="0"/>
-              <a:t>Schild </a:t>
-            </a:r>
-            <a:r>
-              <a:rPr lang="de-DE" dirty="0"/>
-              <a:t>auf </a:t>
-            </a:r>
-            <a:r>
-              <a:rPr lang="de-DE" dirty="0" smtClean="0"/>
-              <a:t>den Schreibtisch </a:t>
-            </a:r>
-            <a:r>
-              <a:rPr lang="de-DE" dirty="0"/>
-              <a:t>stellen oder an die Tür hängen, dass man nicht </a:t>
-            </a:r>
-            <a:r>
-              <a:rPr lang="de-DE" dirty="0" smtClean="0"/>
-              <a:t/>
-            </a:r>
-            <a:br>
-              <a:rPr lang="de-DE" dirty="0" smtClean="0"/>
-            </a:br>
-            <a:r>
-              <a:rPr lang="de-DE" dirty="0" smtClean="0"/>
-              <a:t>gestört werden </a:t>
-            </a:r>
-            <a:r>
-              <a:rPr lang="de-DE" dirty="0"/>
-              <a:t>möchte. </a:t>
-            </a:r>
-            <a:endParaRPr lang="de-DE" dirty="0"/>
-          </a:p>
-          <a:p>
-            <a:r>
-              <a:rPr lang="de-DE" dirty="0"/>
-              <a:t>Erstelle 8 </a:t>
-            </a:r>
-            <a:r>
-              <a:rPr lang="de-DE" dirty="0" smtClean="0"/>
-              <a:t>Störer-</a:t>
-            </a:r>
-            <a:r>
-              <a:rPr lang="de-DE" dirty="0" err="1" smtClean="0"/>
-              <a:t>Ablenker</a:t>
-            </a:r>
-            <a:r>
-              <a:rPr lang="de-DE" dirty="0" smtClean="0"/>
-              <a:t>-Protokolle </a:t>
-            </a:r>
-            <a:r>
-              <a:rPr lang="de-DE" dirty="0"/>
-              <a:t>und zeige sie Deinem Team.</a:t>
+              <a:t>-Protokolle und zeige sie Deinem Team.</a:t>
             </a:r>
           </a:p>
         </p:txBody>

</xml_diff>

<commit_message>
TOm 14 wegen Promotion überarbeitet
</commit_message>
<xml_diff>
--- a/training-cards/music moves/Tomatoes (TOM)/ger/apprentice/ger_TOM_14_Ich_bin_in_einer_Tomate_MM_A.pptx
+++ b/training-cards/music moves/Tomatoes (TOM)/ger/apprentice/ger_TOM_14_Ich_bin_in_einer_Tomate_MM_A.pptx
@@ -724,7 +724,7 @@
           <a:p>
             <a:fld id="{FF5B2BAF-DF38-0A48-A798-0C06E514FD52}" type="datetimeFigureOut">
               <a:rPr lang="de-DE" smtClean="0"/>
-              <a:t>12.09.18</a:t>
+              <a:t>22.07.23</a:t>
             </a:fld>
             <a:endParaRPr lang="de-DE" dirty="0"/>
           </a:p>
@@ -937,7 +937,7 @@
           <a:p>
             <a:fld id="{FF5B2BAF-DF38-0A48-A798-0C06E514FD52}" type="datetimeFigureOut">
               <a:rPr lang="de-DE" smtClean="0"/>
-              <a:t>12.09.18</a:t>
+              <a:t>22.07.23</a:t>
             </a:fld>
             <a:endParaRPr lang="de-DE" dirty="0"/>
           </a:p>
@@ -1819,15 +1819,7 @@
             <a:pPr lvl="1"/>
             <a:r>
               <a:rPr lang="de-DE" sz="850" dirty="0"/>
-              <a:t>Telefon aus und Anrufbeantworter abhören als regelmäßige </a:t>
-            </a:r>
-            <a:r>
-              <a:rPr lang="de-DE" sz="850" dirty="0" err="1"/>
-              <a:t>Pomodoro</a:t>
-            </a:r>
-            <a:r>
-              <a:rPr lang="de-DE" sz="850" dirty="0"/>
-              <a:t> einplanen</a:t>
+              <a:t>Telefon ausschalten und Anrufbeantworter abhören als regelmäßige Pomodoro einplanen</a:t>
             </a:r>
           </a:p>
           <a:p>

</xml_diff>